<commit_message>
added a git pptx from a past workshop
</commit_message>
<xml_diff>
--- a/GitPres.pptx
+++ b/GitPres.pptx
@@ -14574,11 +14574,7 @@
             </a:r>
             <a:r>
               <a:rPr lang="en-US" dirty="0" smtClean="0"/>
-              <a:t>cheat sheet </a:t>
-            </a:r>
-            <a:r>
-              <a:rPr lang="en-US" dirty="0" smtClean="0"/>
-              <a:t>at the bottom of the README file</a:t>
+              <a:t>cheat sheet at the bottom of the README file</a:t>
             </a:r>
             <a:endParaRPr lang="en-US" dirty="0"/>
           </a:p>
@@ -24318,6 +24314,121 @@
             </a:r>
           </a:p>
           <a:p>
+            <a:pPr marL="228600" marR="0" lvl="0" indent="-228600" algn="l" rtl="0">
+              <a:lnSpc>
+                <a:spcPct val="90000"/>
+              </a:lnSpc>
+              <a:spcBef>
+                <a:spcPts val="1000"/>
+              </a:spcBef>
+              <a:spcAft>
+                <a:spcPts val="0"/>
+              </a:spcAft>
+              <a:buClr>
+                <a:schemeClr val="dk1"/>
+              </a:buClr>
+              <a:buSzPct val="100000"/>
+              <a:buFont typeface="Arial"/>
+              <a:buChar char="•"/>
+            </a:pPr>
+            <a:r>
+              <a:rPr lang="en-US" sz="2800" b="0" i="0" u="none" strike="noStrike" cap="none" dirty="0" err="1" smtClean="0">
+                <a:solidFill>
+                  <a:schemeClr val="dk1"/>
+                </a:solidFill>
+                <a:latin typeface="Calibri"/>
+                <a:ea typeface="Calibri"/>
+                <a:cs typeface="Calibri"/>
+                <a:sym typeface="Calibri"/>
+              </a:rPr>
+              <a:t>Git</a:t>
+            </a:r>
+            <a:r>
+              <a:rPr lang="en-US" sz="2800" b="0" i="0" u="none" strike="noStrike" cap="none" dirty="0" smtClean="0">
+                <a:solidFill>
+                  <a:schemeClr val="dk1"/>
+                </a:solidFill>
+                <a:latin typeface="Calibri"/>
+                <a:ea typeface="Calibri"/>
+                <a:cs typeface="Calibri"/>
+                <a:sym typeface="Calibri"/>
+              </a:rPr>
+              <a:t> </a:t>
+            </a:r>
+            <a:r>
+              <a:rPr lang="en-US" sz="2800" b="0" i="0" u="none" strike="noStrike" cap="none" dirty="0">
+                <a:solidFill>
+                  <a:schemeClr val="dk1"/>
+                </a:solidFill>
+                <a:latin typeface="Calibri"/>
+                <a:ea typeface="Calibri"/>
+                <a:cs typeface="Calibri"/>
+                <a:sym typeface="Calibri"/>
+              </a:rPr>
+              <a:t>Add, </a:t>
+            </a:r>
+            <a:r>
+              <a:rPr lang="en-US" sz="2800" b="0" i="0" u="none" strike="noStrike" cap="none" dirty="0" err="1">
+                <a:solidFill>
+                  <a:schemeClr val="dk1"/>
+                </a:solidFill>
+                <a:latin typeface="Calibri"/>
+                <a:ea typeface="Calibri"/>
+                <a:cs typeface="Calibri"/>
+                <a:sym typeface="Calibri"/>
+              </a:rPr>
+              <a:t>Git</a:t>
+            </a:r>
+            <a:r>
+              <a:rPr lang="en-US" sz="2800" b="0" i="0" u="none" strike="noStrike" cap="none" dirty="0">
+                <a:solidFill>
+                  <a:schemeClr val="dk1"/>
+                </a:solidFill>
+                <a:latin typeface="Calibri"/>
+                <a:ea typeface="Calibri"/>
+                <a:cs typeface="Calibri"/>
+                <a:sym typeface="Calibri"/>
+              </a:rPr>
+              <a:t> Commit, </a:t>
+            </a:r>
+            <a:r>
+              <a:rPr lang="en-US" sz="2800" b="0" i="0" u="none" strike="noStrike" cap="none" dirty="0" err="1">
+                <a:solidFill>
+                  <a:schemeClr val="dk1"/>
+                </a:solidFill>
+                <a:latin typeface="Calibri"/>
+                <a:ea typeface="Calibri"/>
+                <a:cs typeface="Calibri"/>
+                <a:sym typeface="Calibri"/>
+              </a:rPr>
+              <a:t>Git</a:t>
+            </a:r>
+            <a:r>
+              <a:rPr lang="en-US" sz="2800" b="0" i="0" u="none" strike="noStrike" cap="none" dirty="0">
+                <a:solidFill>
+                  <a:schemeClr val="dk1"/>
+                </a:solidFill>
+                <a:latin typeface="Calibri"/>
+                <a:ea typeface="Calibri"/>
+                <a:cs typeface="Calibri"/>
+                <a:sym typeface="Calibri"/>
+              </a:rPr>
+              <a:t> </a:t>
+            </a:r>
+            <a:r>
+              <a:rPr lang="en-US" sz="2800" b="0" i="0" u="none" strike="noStrike" cap="none" dirty="0" smtClean="0">
+                <a:solidFill>
+                  <a:schemeClr val="dk1"/>
+                </a:solidFill>
+                <a:latin typeface="Calibri"/>
+                <a:ea typeface="Calibri"/>
+                <a:cs typeface="Calibri"/>
+                <a:sym typeface="Calibri"/>
+              </a:rPr>
+              <a:t>Push</a:t>
+            </a:r>
+          </a:p>
+          <a:p>
             <a:pPr marL="0" marR="0" lvl="0" indent="0" algn="l" rtl="0">
               <a:lnSpc>
                 <a:spcPct val="90000"/>
@@ -24335,30 +24446,22 @@
               <a:buNone/>
             </a:pPr>
             <a:r>
-              <a:rPr lang="en-US" sz="2400" b="0" i="1" u="none" strike="noStrike" cap="none" dirty="0" smtClean="0">
-                <a:solidFill>
-                  <a:schemeClr val="dk1"/>
-                </a:solidFill>
-                <a:latin typeface="Calibri"/>
-                <a:ea typeface="Calibri"/>
-                <a:cs typeface="Calibri"/>
-                <a:sym typeface="Calibri"/>
-              </a:rPr>
-              <a:t>Break for the day</a:t>
-            </a:r>
-            <a:r>
-              <a:rPr lang="en-US" sz="2400" b="0" i="0" u="none" strike="noStrike" cap="none" dirty="0" smtClean="0">
-                <a:solidFill>
-                  <a:schemeClr val="dk1"/>
-                </a:solidFill>
-                <a:latin typeface="Calibri"/>
-                <a:ea typeface="Calibri"/>
-                <a:cs typeface="Calibri"/>
-                <a:sym typeface="Calibri"/>
-              </a:rPr>
-              <a:t> !</a:t>
-            </a:r>
-            <a:endParaRPr lang="en-US" sz="2400" b="0" i="0" u="none" strike="noStrike" cap="none" dirty="0">
+              <a:rPr lang="en-US" i="1" dirty="0" smtClean="0"/>
+              <a:t>Break </a:t>
+            </a:r>
+            <a:r>
+              <a:rPr lang="en-US" i="1" dirty="0"/>
+              <a:t>for the day</a:t>
+            </a:r>
+            <a:r>
+              <a:rPr lang="en-US" dirty="0"/>
+              <a:t> </a:t>
+            </a:r>
+            <a:r>
+              <a:rPr lang="en-US" dirty="0" smtClean="0"/>
+              <a:t>!</a:t>
+            </a:r>
+            <a:endParaRPr lang="en-US" sz="2800" b="0" i="0" u="none" strike="noStrike" cap="none" dirty="0">
               <a:solidFill>
                 <a:schemeClr val="dk1"/>
               </a:solidFill>
@@ -24367,140 +24470,6 @@
               <a:cs typeface="Calibri"/>
               <a:sym typeface="Calibri"/>
             </a:endParaRPr>
-          </a:p>
-          <a:p>
-            <a:pPr marL="228600" marR="0" lvl="0" indent="-228600" algn="l" rtl="0">
-              <a:lnSpc>
-                <a:spcPct val="90000"/>
-              </a:lnSpc>
-              <a:spcBef>
-                <a:spcPts val="1000"/>
-              </a:spcBef>
-              <a:spcAft>
-                <a:spcPts val="0"/>
-              </a:spcAft>
-              <a:buClr>
-                <a:schemeClr val="dk1"/>
-              </a:buClr>
-              <a:buSzPct val="100000"/>
-              <a:buFont typeface="Arial"/>
-              <a:buChar char="•"/>
-            </a:pPr>
-            <a:r>
-              <a:rPr lang="en-US" sz="2800" b="0" i="0" u="none" strike="noStrike" cap="none" dirty="0" smtClean="0">
-                <a:solidFill>
-                  <a:schemeClr val="dk1"/>
-                </a:solidFill>
-                <a:latin typeface="Calibri"/>
-                <a:ea typeface="Calibri"/>
-                <a:cs typeface="Calibri"/>
-                <a:sym typeface="Calibri"/>
-              </a:rPr>
-              <a:t>Review</a:t>
-            </a:r>
-          </a:p>
-          <a:p>
-            <a:pPr marL="228600" marR="0" lvl="0" indent="-228600" algn="l" rtl="0">
-              <a:lnSpc>
-                <a:spcPct val="90000"/>
-              </a:lnSpc>
-              <a:spcBef>
-                <a:spcPts val="1000"/>
-              </a:spcBef>
-              <a:spcAft>
-                <a:spcPts val="0"/>
-              </a:spcAft>
-              <a:buClr>
-                <a:schemeClr val="dk1"/>
-              </a:buClr>
-              <a:buSzPct val="100000"/>
-              <a:buFont typeface="Arial"/>
-              <a:buChar char="•"/>
-            </a:pPr>
-            <a:r>
-              <a:rPr lang="en-US" sz="2800" b="0" i="0" u="none" strike="noStrike" cap="none" dirty="0" err="1" smtClean="0">
-                <a:solidFill>
-                  <a:schemeClr val="dk1"/>
-                </a:solidFill>
-                <a:latin typeface="Calibri"/>
-                <a:ea typeface="Calibri"/>
-                <a:cs typeface="Calibri"/>
-                <a:sym typeface="Calibri"/>
-              </a:rPr>
-              <a:t>Git</a:t>
-            </a:r>
-            <a:r>
-              <a:rPr lang="en-US" sz="2800" b="0" i="0" u="none" strike="noStrike" cap="none" dirty="0" smtClean="0">
-                <a:solidFill>
-                  <a:schemeClr val="dk1"/>
-                </a:solidFill>
-                <a:latin typeface="Calibri"/>
-                <a:ea typeface="Calibri"/>
-                <a:cs typeface="Calibri"/>
-                <a:sym typeface="Calibri"/>
-              </a:rPr>
-              <a:t> </a:t>
-            </a:r>
-            <a:r>
-              <a:rPr lang="en-US" sz="2800" b="0" i="0" u="none" strike="noStrike" cap="none" dirty="0">
-                <a:solidFill>
-                  <a:schemeClr val="dk1"/>
-                </a:solidFill>
-                <a:latin typeface="Calibri"/>
-                <a:ea typeface="Calibri"/>
-                <a:cs typeface="Calibri"/>
-                <a:sym typeface="Calibri"/>
-              </a:rPr>
-              <a:t>Add, </a:t>
-            </a:r>
-            <a:r>
-              <a:rPr lang="en-US" sz="2800" b="0" i="0" u="none" strike="noStrike" cap="none" dirty="0" err="1">
-                <a:solidFill>
-                  <a:schemeClr val="dk1"/>
-                </a:solidFill>
-                <a:latin typeface="Calibri"/>
-                <a:ea typeface="Calibri"/>
-                <a:cs typeface="Calibri"/>
-                <a:sym typeface="Calibri"/>
-              </a:rPr>
-              <a:t>Git</a:t>
-            </a:r>
-            <a:r>
-              <a:rPr lang="en-US" sz="2800" b="0" i="0" u="none" strike="noStrike" cap="none" dirty="0">
-                <a:solidFill>
-                  <a:schemeClr val="dk1"/>
-                </a:solidFill>
-                <a:latin typeface="Calibri"/>
-                <a:ea typeface="Calibri"/>
-                <a:cs typeface="Calibri"/>
-                <a:sym typeface="Calibri"/>
-              </a:rPr>
-              <a:t> Commit, </a:t>
-            </a:r>
-            <a:r>
-              <a:rPr lang="en-US" sz="2800" b="0" i="0" u="none" strike="noStrike" cap="none" dirty="0" err="1">
-                <a:solidFill>
-                  <a:schemeClr val="dk1"/>
-                </a:solidFill>
-                <a:latin typeface="Calibri"/>
-                <a:ea typeface="Calibri"/>
-                <a:cs typeface="Calibri"/>
-                <a:sym typeface="Calibri"/>
-              </a:rPr>
-              <a:t>Git</a:t>
-            </a:r>
-            <a:r>
-              <a:rPr lang="en-US" sz="2800" b="0" i="0" u="none" strike="noStrike" cap="none" dirty="0">
-                <a:solidFill>
-                  <a:schemeClr val="dk1"/>
-                </a:solidFill>
-                <a:latin typeface="Calibri"/>
-                <a:ea typeface="Calibri"/>
-                <a:cs typeface="Calibri"/>
-                <a:sym typeface="Calibri"/>
-              </a:rPr>
-              <a:t> Push</a:t>
-            </a:r>
           </a:p>
           <a:p>
             <a:pPr marL="228600" marR="0" lvl="0" indent="-228600" algn="l" rtl="0">

</xml_diff>

<commit_message>
fixed paths to images
</commit_message>
<xml_diff>
--- a/GitPres.pptx
+++ b/GitPres.pptx
@@ -22077,119 +22077,29 @@
               <a:buNone/>
             </a:pPr>
             <a:r>
-              <a:rPr lang="en-US" sz="4400" b="1" i="0" u="none" strike="noStrike" cap="none">
-                <a:solidFill>
-                  <a:schemeClr val="dk1"/>
-                </a:solidFill>
-                <a:latin typeface="Calibri"/>
-                <a:ea typeface="Calibri"/>
-                <a:cs typeface="Calibri"/>
-                <a:sym typeface="Calibri"/>
-              </a:rPr>
-              <a:t>Git clone</a:t>
-            </a:r>
-          </a:p>
-        </p:txBody>
-      </p:sp>
-      <p:sp>
-        <p:nvSpPr>
-          <p:cNvPr id="256" name="Shape 256"/>
-          <p:cNvSpPr txBox="1">
-            <a:spLocks noGrp="1"/>
-          </p:cNvSpPr>
-          <p:nvPr>
-            <p:ph type="body" idx="1"/>
-          </p:nvPr>
-        </p:nvSpPr>
-        <p:spPr>
-          <a:xfrm>
-            <a:off x="990599" y="5182503"/>
-            <a:ext cx="10363200" cy="1003864"/>
-          </a:xfrm>
-          <a:prstGeom prst="rect">
-            <a:avLst/>
-          </a:prstGeom>
-          <a:noFill/>
-          <a:ln>
-            <a:noFill/>
-          </a:ln>
-        </p:spPr>
-        <p:txBody>
-          <a:bodyPr lIns="91425" tIns="45700" rIns="91425" bIns="45700" anchor="t" anchorCtr="0">
-            <a:noAutofit/>
-          </a:bodyPr>
-          <a:lstStyle/>
-          <a:p>
-            <a:pPr lvl="0" rtl="0">
-              <a:spcBef>
-                <a:spcPts val="0"/>
-              </a:spcBef>
-              <a:buClr>
-                <a:schemeClr val="dk1"/>
-              </a:buClr>
-              <a:buSzPct val="100000"/>
-              <a:buFont typeface="Arial"/>
-              <a:buChar char="•"/>
-            </a:pPr>
-            <a:r>
-              <a:rPr lang="en-US" dirty="0"/>
-              <a:t>If you want to clone any other user’s repo, you can use</a:t>
-            </a:r>
-          </a:p>
-          <a:p>
-            <a:pPr marL="0" lvl="0" indent="-69850" rtl="0">
-              <a:spcBef>
-                <a:spcPts val="0"/>
-              </a:spcBef>
-              <a:buClr>
-                <a:srgbClr val="000000"/>
-              </a:buClr>
-              <a:buSzPct val="39285"/>
-              <a:buNone/>
-            </a:pPr>
-            <a:r>
-              <a:rPr lang="en-US" b="1" dirty="0" err="1">
-                <a:latin typeface="Courier New"/>
-                <a:ea typeface="Courier New"/>
-                <a:cs typeface="Courier New"/>
-                <a:sym typeface="Courier New"/>
-              </a:rPr>
-              <a:t>git</a:t>
-            </a:r>
-            <a:r>
-              <a:rPr lang="en-US" b="1" dirty="0">
-                <a:latin typeface="Courier New"/>
-                <a:ea typeface="Courier New"/>
-                <a:cs typeface="Courier New"/>
-                <a:sym typeface="Courier New"/>
-              </a:rPr>
-              <a:t> clone [URL of your GitHub repo]</a:t>
-            </a:r>
-          </a:p>
-          <a:p>
-            <a:pPr marL="228600" marR="0" lvl="0" indent="-228600" algn="l" rtl="0">
-              <a:lnSpc>
-                <a:spcPct val="90000"/>
-              </a:lnSpc>
-              <a:spcBef>
-                <a:spcPts val="1000"/>
-              </a:spcBef>
-              <a:buClr>
-                <a:schemeClr val="dk1"/>
-              </a:buClr>
-              <a:buSzPct val="100000"/>
-              <a:buFont typeface="Arial"/>
-              <a:buNone/>
-            </a:pPr>
-            <a:endParaRPr sz="2800" b="0" i="0" u="none" strike="noStrike" cap="none" dirty="0">
-              <a:solidFill>
-                <a:schemeClr val="dk1"/>
-              </a:solidFill>
-              <a:latin typeface="Calibri"/>
-              <a:ea typeface="Calibri"/>
-              <a:cs typeface="Calibri"/>
-              <a:sym typeface="Calibri"/>
-            </a:endParaRPr>
+              <a:rPr lang="en-US" sz="4400" b="1" i="0" u="none" strike="noStrike" cap="none" dirty="0" err="1">
+                <a:solidFill>
+                  <a:schemeClr val="dk1"/>
+                </a:solidFill>
+                <a:latin typeface="Calibri"/>
+                <a:ea typeface="Calibri"/>
+                <a:cs typeface="Calibri"/>
+                <a:sym typeface="Calibri"/>
+              </a:rPr>
+              <a:t>Git</a:t>
+            </a:r>
+            <a:r>
+              <a:rPr lang="en-US" sz="4400" b="1" i="0" u="none" strike="noStrike" cap="none" dirty="0">
+                <a:solidFill>
+                  <a:schemeClr val="dk1"/>
+                </a:solidFill>
+                <a:latin typeface="Calibri"/>
+                <a:ea typeface="Calibri"/>
+                <a:cs typeface="Calibri"/>
+                <a:sym typeface="Calibri"/>
+              </a:rPr>
+              <a:t> clone</a:t>
+            </a:r>
           </a:p>
         </p:txBody>
       </p:sp>
@@ -22205,7 +22115,7 @@
         </p:nvSpPr>
         <p:spPr>
           <a:xfrm>
-            <a:off x="990599" y="2950401"/>
+            <a:off x="990600" y="2851248"/>
             <a:ext cx="10871886" cy="2232102"/>
           </a:xfrm>
           <a:prstGeom prst="rect">
@@ -22296,21 +22206,8 @@
             </a:r>
           </a:p>
           <a:p>
-            <a:pPr marL="0" marR="0" lvl="0" indent="0" algn="l" rtl="0">
-              <a:lnSpc>
-                <a:spcPct val="90000"/>
-              </a:lnSpc>
-              <a:spcBef>
-                <a:spcPts val="1000"/>
-              </a:spcBef>
-              <a:spcAft>
-                <a:spcPts val="0"/>
-              </a:spcAft>
-              <a:buClr>
-                <a:schemeClr val="dk1"/>
-              </a:buClr>
+            <a:pPr marL="0" lvl="0" indent="0">
               <a:buSzPct val="25000"/>
-              <a:buFont typeface="Arial"/>
               <a:buNone/>
             </a:pPr>
             <a:r>
@@ -22350,7 +22247,7 @@
               <a:t>https://</a:t>
             </a:r>
             <a:r>
-              <a:rPr lang="en-US" sz="2800" b="1" i="0" strike="noStrike" cap="none" dirty="0" err="1" smtClean="0">
+              <a:rPr lang="en-US" b="1" dirty="0" err="1" smtClean="0">
                 <a:solidFill>
                   <a:schemeClr val="tx1"/>
                 </a:solidFill>
@@ -22362,7 +22259,7 @@
               <a:t>github.com</a:t>
             </a:r>
             <a:r>
-              <a:rPr lang="en-US" sz="2800" b="1" i="0" strike="noStrike" cap="none" dirty="0" smtClean="0">
+              <a:rPr lang="en-US" b="1" dirty="0" smtClean="0">
                 <a:solidFill>
                   <a:schemeClr val="tx1"/>
                 </a:solidFill>
@@ -22374,7 +22271,7 @@
               <a:t>/</a:t>
             </a:r>
             <a:r>
-              <a:rPr lang="en-US" sz="2800" b="1" i="0" strike="noStrike" cap="none" dirty="0" err="1" smtClean="0">
+              <a:rPr lang="en-US" b="1" dirty="0" err="1" smtClean="0">
                 <a:solidFill>
                   <a:schemeClr val="tx1"/>
                 </a:solidFill>
@@ -22386,7 +22283,7 @@
               <a:t>jojokarlin</a:t>
             </a:r>
             <a:r>
-              <a:rPr lang="en-US" sz="2800" b="1" i="0" strike="noStrike" cap="none" dirty="0" smtClean="0">
+              <a:rPr lang="en-US" b="1" dirty="0" smtClean="0">
                 <a:solidFill>
                   <a:schemeClr val="tx1"/>
                 </a:solidFill>
@@ -22395,84 +22292,126 @@
                 <a:cs typeface="Courier New"/>
                 <a:sym typeface="Courier New"/>
               </a:rPr>
-              <a:t>/</a:t>
-            </a:r>
-            <a:r>
-              <a:rPr lang="en-US" sz="2800" b="1" i="0" strike="noStrike" cap="none" dirty="0" err="1" smtClean="0">
+              <a:t>/Git_DRI_Jan_2017 </a:t>
+            </a:r>
+          </a:p>
+          <a:p>
+            <a:pPr marL="457200" indent="-457200">
+              <a:buSzPct val="25000"/>
+              <a:buFont typeface="Arial" charset="0"/>
+              <a:buChar char="•"/>
+            </a:pPr>
+            <a:r>
+              <a:rPr lang="en-US" dirty="0" smtClean="0">
                 <a:solidFill>
                   <a:schemeClr val="tx1"/>
                 </a:solidFill>
+                <a:latin typeface="Calibri" charset="0"/>
+                <a:ea typeface="Calibri" charset="0"/>
+                <a:cs typeface="Calibri" charset="0"/>
+                <a:sym typeface="Courier New"/>
+              </a:rPr>
+              <a:t>Take </a:t>
+            </a:r>
+            <a:r>
+              <a:rPr lang="en-US" dirty="0" smtClean="0">
+                <a:solidFill>
+                  <a:schemeClr val="tx1"/>
+                </a:solidFill>
+                <a:latin typeface="Calibri" charset="0"/>
+                <a:ea typeface="Calibri" charset="0"/>
+                <a:cs typeface="Calibri" charset="0"/>
+                <a:sym typeface="Courier New"/>
+              </a:rPr>
+              <a:t>a look in your Desktop to see if you have a new </a:t>
+            </a:r>
+            <a:r>
+              <a:rPr lang="en-US" dirty="0" err="1" smtClean="0">
+                <a:solidFill>
+                  <a:schemeClr val="tx1"/>
+                </a:solidFill>
+                <a:latin typeface="Calibri" charset="0"/>
+                <a:ea typeface="Calibri" charset="0"/>
+                <a:cs typeface="Calibri" charset="0"/>
+                <a:sym typeface="Courier New"/>
+              </a:rPr>
+              <a:t>GitDRI</a:t>
+            </a:r>
+            <a:r>
+              <a:rPr lang="en-US" dirty="0" smtClean="0">
+                <a:solidFill>
+                  <a:schemeClr val="tx1"/>
+                </a:solidFill>
+                <a:latin typeface="Calibri" charset="0"/>
+                <a:ea typeface="Calibri" charset="0"/>
+                <a:cs typeface="Calibri" charset="0"/>
+                <a:sym typeface="Courier New"/>
+              </a:rPr>
+              <a:t> </a:t>
+            </a:r>
+            <a:r>
+              <a:rPr lang="en-US" dirty="0" smtClean="0">
+                <a:solidFill>
+                  <a:schemeClr val="tx1"/>
+                </a:solidFill>
+                <a:latin typeface="Calibri" charset="0"/>
+                <a:ea typeface="Calibri" charset="0"/>
+                <a:cs typeface="Calibri" charset="0"/>
+                <a:sym typeface="Courier New"/>
+              </a:rPr>
+              <a:t>folder</a:t>
+            </a:r>
+          </a:p>
+          <a:p>
+            <a:pPr marL="457200" indent="-457200">
+              <a:buSzPct val="25000"/>
+              <a:buFont typeface="Arial" charset="0"/>
+              <a:buChar char="•"/>
+            </a:pPr>
+            <a:r>
+              <a:rPr lang="en-US" dirty="0" smtClean="0"/>
+              <a:t>If </a:t>
+            </a:r>
+            <a:r>
+              <a:rPr lang="en-US" dirty="0"/>
+              <a:t>you want to clone any other user’s repo, you can use</a:t>
+            </a:r>
+          </a:p>
+          <a:p>
+            <a:pPr marL="0" lvl="0" indent="-69850">
+              <a:spcBef>
+                <a:spcPts val="0"/>
+              </a:spcBef>
+              <a:buClr>
+                <a:srgbClr val="000000"/>
+              </a:buClr>
+              <a:buSzPct val="39285"/>
+              <a:buNone/>
+            </a:pPr>
+            <a:r>
+              <a:rPr lang="en-US" b="1" dirty="0" err="1">
                 <a:latin typeface="Courier New"/>
                 <a:ea typeface="Courier New"/>
                 <a:cs typeface="Courier New"/>
                 <a:sym typeface="Courier New"/>
               </a:rPr>
-              <a:t>GitDRI</a:t>
-            </a:r>
-            <a:endParaRPr lang="en-US" b="1" dirty="0">
-              <a:solidFill>
-                <a:schemeClr val="tx1"/>
-              </a:solidFill>
-              <a:latin typeface="Courier New"/>
-              <a:ea typeface="Courier New"/>
-              <a:cs typeface="Courier New"/>
-              <a:sym typeface="Courier New"/>
-            </a:endParaRPr>
-          </a:p>
-          <a:p>
-            <a:pPr marL="0" marR="0" lvl="0" indent="0" algn="l" rtl="0">
-              <a:lnSpc>
-                <a:spcPct val="90000"/>
-              </a:lnSpc>
-              <a:spcBef>
-                <a:spcPts val="1000"/>
-              </a:spcBef>
-              <a:spcAft>
-                <a:spcPts val="0"/>
-              </a:spcAft>
-              <a:buClr>
-                <a:schemeClr val="dk1"/>
-              </a:buClr>
+              <a:t>git</a:t>
+            </a:r>
+            <a:r>
+              <a:rPr lang="en-US" b="1" dirty="0">
+                <a:latin typeface="Courier New"/>
+                <a:ea typeface="Courier New"/>
+                <a:cs typeface="Courier New"/>
+                <a:sym typeface="Courier New"/>
+              </a:rPr>
+              <a:t> clone [URL of your GitHub repo]</a:t>
+            </a:r>
+          </a:p>
+          <a:p>
+            <a:pPr marL="0" lvl="0" indent="0">
               <a:buSzPct val="25000"/>
-              <a:buFont typeface="Arial"/>
               <a:buNone/>
             </a:pPr>
-            <a:r>
-              <a:rPr lang="en-US" dirty="0" smtClean="0">
-                <a:solidFill>
-                  <a:schemeClr val="tx1"/>
-                </a:solidFill>
-                <a:latin typeface="Calibri" charset="0"/>
-                <a:ea typeface="Calibri" charset="0"/>
-                <a:cs typeface="Calibri" charset="0"/>
-                <a:sym typeface="Courier New"/>
-              </a:rPr>
-              <a:t>Take a look in your Desktop to see if you have a new </a:t>
-            </a:r>
-            <a:r>
-              <a:rPr lang="en-US" dirty="0" err="1" smtClean="0">
-                <a:solidFill>
-                  <a:schemeClr val="tx1"/>
-                </a:solidFill>
-                <a:latin typeface="Calibri" charset="0"/>
-                <a:ea typeface="Calibri" charset="0"/>
-                <a:cs typeface="Calibri" charset="0"/>
-                <a:sym typeface="Courier New"/>
-              </a:rPr>
-              <a:t>GitDRI</a:t>
-            </a:r>
-            <a:r>
-              <a:rPr lang="en-US" dirty="0" smtClean="0">
-                <a:solidFill>
-                  <a:schemeClr val="tx1"/>
-                </a:solidFill>
-                <a:latin typeface="Calibri" charset="0"/>
-                <a:ea typeface="Calibri" charset="0"/>
-                <a:cs typeface="Calibri" charset="0"/>
-                <a:sym typeface="Courier New"/>
-              </a:rPr>
-              <a:t> folder</a:t>
-            </a:r>
             <a:endParaRPr sz="2800" i="0" strike="noStrike" cap="none" dirty="0">
               <a:solidFill>
                 <a:schemeClr val="tx1"/>
@@ -22532,7 +22471,7 @@
               <a:buChar char="•"/>
             </a:pPr>
             <a:r>
-              <a:rPr lang="en-US" sz="2800" b="0" i="0" u="none" strike="noStrike" cap="none">
+              <a:rPr lang="en-US" sz="2800" b="0" i="0" u="none" strike="noStrike" cap="none" dirty="0">
                 <a:solidFill>
                   <a:schemeClr val="dk1"/>
                 </a:solidFill>
@@ -22563,7 +22502,7 @@
               <a:buChar char="•"/>
             </a:pPr>
             <a:r>
-              <a:rPr lang="en-US" sz="2800" b="0" i="0" u="none" strike="noStrike" cap="none">
+              <a:rPr lang="en-US" sz="2800" b="0" i="0" u="none" strike="noStrike" cap="none" dirty="0">
                 <a:solidFill>
                   <a:schemeClr val="dk1"/>
                 </a:solidFill>
@@ -22590,7 +22529,7 @@
               <a:buFont typeface="Arial"/>
               <a:buNone/>
             </a:pPr>
-            <a:endParaRPr sz="2800" b="0" i="0" u="none" strike="noStrike" cap="none">
+            <a:endParaRPr sz="2800" b="0" i="0" u="none" strike="noStrike" cap="none" dirty="0">
               <a:solidFill>
                 <a:schemeClr val="dk1"/>
               </a:solidFill>
@@ -22720,15 +22659,33 @@
                                   </p:childTnLst>
                                 </p:cTn>
                               </p:par>
+                            </p:childTnLst>
+                          </p:cTn>
+                        </p:par>
+                      </p:childTnLst>
+                    </p:cTn>
+                  </p:par>
+                  <p:par>
+                    <p:cTn id="11" fill="hold">
+                      <p:stCondLst>
+                        <p:cond delay="indefinite"/>
+                      </p:stCondLst>
+                      <p:childTnLst>
+                        <p:par>
+                          <p:cTn id="12" fill="hold">
+                            <p:stCondLst>
+                              <p:cond delay="0"/>
+                            </p:stCondLst>
+                            <p:childTnLst>
                               <p:par>
-                                <p:cTn id="11" presetID="1" presetClass="entr" presetSubtype="0" fill="hold" grpId="0" nodeType="withEffect">
+                                <p:cTn id="13" presetID="1" presetClass="entr" presetSubtype="0" fill="hold" grpId="0" nodeType="clickEffect">
                                   <p:stCondLst>
                                     <p:cond delay="0"/>
                                   </p:stCondLst>
                                   <p:childTnLst>
                                     <p:set>
                                       <p:cBhvr>
-                                        <p:cTn id="12" dur="1" fill="hold">
+                                        <p:cTn id="14" dur="1" fill="hold">
                                           <p:stCondLst>
                                             <p:cond delay="0"/>
                                           </p:stCondLst>
@@ -22758,34 +22715,34 @@
                     </p:cTn>
                   </p:par>
                   <p:par>
-                    <p:cTn id="13" fill="hold">
+                    <p:cTn id="15" fill="hold">
                       <p:stCondLst>
                         <p:cond delay="indefinite"/>
                       </p:stCondLst>
                       <p:childTnLst>
                         <p:par>
-                          <p:cTn id="14" fill="hold">
+                          <p:cTn id="16" fill="hold">
                             <p:stCondLst>
                               <p:cond delay="0"/>
                             </p:stCondLst>
                             <p:childTnLst>
                               <p:par>
-                                <p:cTn id="15" presetID="1" presetClass="entr" presetSubtype="0" fill="hold" grpId="0" nodeType="clickEffect">
+                                <p:cTn id="17" presetID="1" presetClass="entr" presetSubtype="0" fill="hold" grpId="0" nodeType="clickEffect">
                                   <p:stCondLst>
                                     <p:cond delay="0"/>
                                   </p:stCondLst>
                                   <p:childTnLst>
                                     <p:set>
                                       <p:cBhvr>
-                                        <p:cTn id="16" dur="1" fill="hold">
+                                        <p:cTn id="18" dur="1" fill="hold">
                                           <p:stCondLst>
                                             <p:cond delay="0"/>
                                           </p:stCondLst>
                                         </p:cTn>
                                         <p:tgtEl>
-                                          <p:spTgt spid="256">
+                                          <p:spTgt spid="257">
                                             <p:txEl>
-                                              <p:pRg st="0" end="0"/>
+                                              <p:pRg st="4" end="4"/>
                                             </p:txEl>
                                           </p:spTgt>
                                         </p:tgtEl>
@@ -22800,23 +22757,41 @@
                                   </p:childTnLst>
                                 </p:cTn>
                               </p:par>
+                            </p:childTnLst>
+                          </p:cTn>
+                        </p:par>
+                      </p:childTnLst>
+                    </p:cTn>
+                  </p:par>
+                  <p:par>
+                    <p:cTn id="19" fill="hold">
+                      <p:stCondLst>
+                        <p:cond delay="indefinite"/>
+                      </p:stCondLst>
+                      <p:childTnLst>
+                        <p:par>
+                          <p:cTn id="20" fill="hold">
+                            <p:stCondLst>
+                              <p:cond delay="0"/>
+                            </p:stCondLst>
+                            <p:childTnLst>
                               <p:par>
-                                <p:cTn id="17" presetID="1" presetClass="entr" presetSubtype="0" fill="hold" grpId="0" nodeType="withEffect">
+                                <p:cTn id="21" presetID="1" presetClass="entr" presetSubtype="0" fill="hold" grpId="0" nodeType="clickEffect">
                                   <p:stCondLst>
                                     <p:cond delay="0"/>
                                   </p:stCondLst>
                                   <p:childTnLst>
                                     <p:set>
                                       <p:cBhvr>
-                                        <p:cTn id="18" dur="1" fill="hold">
+                                        <p:cTn id="22" dur="1" fill="hold">
                                           <p:stCondLst>
                                             <p:cond delay="0"/>
                                           </p:stCondLst>
                                         </p:cTn>
                                         <p:tgtEl>
-                                          <p:spTgt spid="256">
+                                          <p:spTgt spid="257">
                                             <p:txEl>
-                                              <p:pRg st="1" end="1"/>
+                                              <p:pRg st="5" end="5"/>
                                             </p:txEl>
                                           </p:spTgt>
                                         </p:tgtEl>
@@ -22859,7 +22834,6 @@
       </p:par>
     </p:tnLst>
     <p:bldLst>
-      <p:bldP spid="256" grpId="0" uiExpand="1" build="p"/>
       <p:bldP spid="257" grpId="0" uiExpand="1" build="p"/>
     </p:bldLst>
   </p:timing>
@@ -23042,27 +23016,25 @@
               </a:rPr>
               <a:t>You will need to pull the repo </a:t>
             </a:r>
-          </a:p>
-          <a:p>
-            <a:pPr marL="685800" marR="0" lvl="1" indent="-228600" algn="l" rtl="0">
-              <a:lnSpc>
-                <a:spcPct val="90000"/>
-              </a:lnSpc>
-              <a:spcBef>
-                <a:spcPts val="500"/>
-              </a:spcBef>
-              <a:spcAft>
-                <a:spcPts val="0"/>
-              </a:spcAft>
-              <a:buClr>
-                <a:schemeClr val="dk1"/>
-              </a:buClr>
-              <a:buSzPct val="100000"/>
-              <a:buFont typeface="Arial"/>
-              <a:buChar char="•"/>
+            <a:endParaRPr lang="en-US" sz="2800" b="0" i="0" u="none" strike="noStrike" cap="none" dirty="0" smtClean="0">
+              <a:solidFill>
+                <a:schemeClr val="dk1"/>
+              </a:solidFill>
+              <a:latin typeface="Calibri"/>
+              <a:ea typeface="Calibri"/>
+              <a:cs typeface="Calibri"/>
+              <a:sym typeface="Calibri"/>
+            </a:endParaRPr>
+          </a:p>
+          <a:p>
+            <a:pPr marL="914400" lvl="2" indent="0">
+              <a:spcBef>
+                <a:spcPts val="1000"/>
+              </a:spcBef>
+              <a:buNone/>
             </a:pPr>
             <a:r>
-              <a:rPr lang="en-US" sz="2400" b="0" i="0" u="none" strike="noStrike" cap="none" dirty="0">
+              <a:rPr lang="en-US" sz="1600" b="0" i="0" u="none" strike="noStrike" cap="none" dirty="0" smtClean="0">
                 <a:solidFill>
                   <a:schemeClr val="dk1"/>
                 </a:solidFill>

</xml_diff>